<commit_message>
Updated powerpoint with new dashboard screenshot.
</commit_message>
<xml_diff>
--- a/Avengers_Hackathon.pptx
+++ b/Avengers_Hackathon.pptx
@@ -4263,32 +4263,49 @@
       </p:sp>
       <p:pic>
         <p:nvPicPr>
-          <p:cNvPr id="7" name="Picture 6">
-            <a:extLst>
-              <a:ext uri="{FF2B5EF4-FFF2-40B4-BE49-F238E27FC236}">
-                <a16:creationId xmlns:a16="http://schemas.microsoft.com/office/drawing/2014/main" id="{28A56FE1-7ABA-A4EA-096F-C5C7846566FE}"/>
+          <p:cNvPr id="1026" name="Picture 2">
+            <a:extLst>
+              <a:ext uri="{FF2B5EF4-FFF2-40B4-BE49-F238E27FC236}">
+                <a16:creationId xmlns:a16="http://schemas.microsoft.com/office/drawing/2014/main" id="{F4DDCF44-8878-3ECF-34B2-8BC8B9C48BB0}"/>
               </a:ext>
             </a:extLst>
           </p:cNvPr>
           <p:cNvPicPr>
-            <a:picLocks noChangeAspect="1"/>
+            <a:picLocks noChangeAspect="1" noChangeArrowheads="1"/>
           </p:cNvPicPr>
           <p:nvPr/>
         </p:nvPicPr>
         <p:blipFill>
-          <a:blip r:embed="rId3"/>
+          <a:blip r:embed="rId3">
+            <a:extLst>
+              <a:ext uri="{28A0092B-C50C-407E-A947-70E740481C1C}">
+                <a14:useLocalDpi xmlns:a14="http://schemas.microsoft.com/office/drawing/2010/main" val="0"/>
+              </a:ext>
+            </a:extLst>
+          </a:blip>
+          <a:srcRect/>
           <a:stretch>
             <a:fillRect/>
           </a:stretch>
         </p:blipFill>
-        <p:spPr>
+        <p:spPr bwMode="auto">
           <a:xfrm>
-            <a:off x="2533455" y="2723535"/>
-            <a:ext cx="7125089" cy="3220065"/>
+            <a:off x="2656147" y="2676112"/>
+            <a:ext cx="6879705" cy="3285776"/>
           </a:xfrm>
           <a:prstGeom prst="rect">
             <a:avLst/>
           </a:prstGeom>
+          <a:noFill/>
+          <a:extLst>
+            <a:ext uri="{909E8E84-426E-40DD-AFC4-6F175D3DCCD1}">
+              <a14:hiddenFill xmlns:a14="http://schemas.microsoft.com/office/drawing/2010/main">
+                <a:solidFill>
+                  <a:srgbClr val="FFFFFF"/>
+                </a:solidFill>
+              </a14:hiddenFill>
+            </a:ext>
+          </a:extLst>
         </p:spPr>
       </p:pic>
     </p:spTree>

</xml_diff>